<commit_message>
some work on schematic figure
</commit_message>
<xml_diff>
--- a/pinpaircartoon.pptx
+++ b/pinpaircartoon.pptx
@@ -104,6 +104,11 @@
       </a:defRPr>
     </a:lvl9pPr>
   </p:defaultTextStyle>
+  <p:extLst>
+    <p:ext uri="{EFAFB233-063F-42B5-8137-9DF3F51BA10A}">
+      <p15:sldGuideLst xmlns:p15="http://schemas.microsoft.com/office/powerpoint/2012/main"/>
+    </p:ext>
+  </p:extLst>
 </p:presentation>
 </file>
 
@@ -238,7 +243,7 @@
           <a:p>
             <a:fld id="{3FD5B866-13A1-FD42-B59E-EB112ACE594C}" type="datetimeFigureOut">
               <a:rPr lang="en-US" smtClean="0"/>
-              <a:t>4/10/18</a:t>
+              <a:t>4/11/2018</a:t>
             </a:fld>
             <a:endParaRPr lang="en-US"/>
           </a:p>
@@ -408,7 +413,7 @@
           <a:p>
             <a:fld id="{3FD5B866-13A1-FD42-B59E-EB112ACE594C}" type="datetimeFigureOut">
               <a:rPr lang="en-US" smtClean="0"/>
-              <a:t>4/10/18</a:t>
+              <a:t>4/11/2018</a:t>
             </a:fld>
             <a:endParaRPr lang="en-US"/>
           </a:p>
@@ -588,7 +593,7 @@
           <a:p>
             <a:fld id="{3FD5B866-13A1-FD42-B59E-EB112ACE594C}" type="datetimeFigureOut">
               <a:rPr lang="en-US" smtClean="0"/>
-              <a:t>4/10/18</a:t>
+              <a:t>4/11/2018</a:t>
             </a:fld>
             <a:endParaRPr lang="en-US"/>
           </a:p>
@@ -758,7 +763,7 @@
           <a:p>
             <a:fld id="{3FD5B866-13A1-FD42-B59E-EB112ACE594C}" type="datetimeFigureOut">
               <a:rPr lang="en-US" smtClean="0"/>
-              <a:t>4/10/18</a:t>
+              <a:t>4/11/2018</a:t>
             </a:fld>
             <a:endParaRPr lang="en-US"/>
           </a:p>
@@ -1004,7 +1009,7 @@
           <a:p>
             <a:fld id="{3FD5B866-13A1-FD42-B59E-EB112ACE594C}" type="datetimeFigureOut">
               <a:rPr lang="en-US" smtClean="0"/>
-              <a:t>4/10/18</a:t>
+              <a:t>4/11/2018</a:t>
             </a:fld>
             <a:endParaRPr lang="en-US"/>
           </a:p>
@@ -1236,7 +1241,7 @@
           <a:p>
             <a:fld id="{3FD5B866-13A1-FD42-B59E-EB112ACE594C}" type="datetimeFigureOut">
               <a:rPr lang="en-US" smtClean="0"/>
-              <a:t>4/10/18</a:t>
+              <a:t>4/11/2018</a:t>
             </a:fld>
             <a:endParaRPr lang="en-US"/>
           </a:p>
@@ -1603,7 +1608,7 @@
           <a:p>
             <a:fld id="{3FD5B866-13A1-FD42-B59E-EB112ACE594C}" type="datetimeFigureOut">
               <a:rPr lang="en-US" smtClean="0"/>
-              <a:t>4/10/18</a:t>
+              <a:t>4/11/2018</a:t>
             </a:fld>
             <a:endParaRPr lang="en-US"/>
           </a:p>
@@ -1721,7 +1726,7 @@
           <a:p>
             <a:fld id="{3FD5B866-13A1-FD42-B59E-EB112ACE594C}" type="datetimeFigureOut">
               <a:rPr lang="en-US" smtClean="0"/>
-              <a:t>4/10/18</a:t>
+              <a:t>4/11/2018</a:t>
             </a:fld>
             <a:endParaRPr lang="en-US"/>
           </a:p>
@@ -1816,7 +1821,7 @@
           <a:p>
             <a:fld id="{3FD5B866-13A1-FD42-B59E-EB112ACE594C}" type="datetimeFigureOut">
               <a:rPr lang="en-US" smtClean="0"/>
-              <a:t>4/10/18</a:t>
+              <a:t>4/11/2018</a:t>
             </a:fld>
             <a:endParaRPr lang="en-US"/>
           </a:p>
@@ -2093,7 +2098,7 @@
           <a:p>
             <a:fld id="{3FD5B866-13A1-FD42-B59E-EB112ACE594C}" type="datetimeFigureOut">
               <a:rPr lang="en-US" smtClean="0"/>
-              <a:t>4/10/18</a:t>
+              <a:t>4/11/2018</a:t>
             </a:fld>
             <a:endParaRPr lang="en-US"/>
           </a:p>
@@ -2346,7 +2351,7 @@
           <a:p>
             <a:fld id="{3FD5B866-13A1-FD42-B59E-EB112ACE594C}" type="datetimeFigureOut">
               <a:rPr lang="en-US" smtClean="0"/>
-              <a:t>4/10/18</a:t>
+              <a:t>4/11/2018</a:t>
             </a:fld>
             <a:endParaRPr lang="en-US"/>
           </a:p>
@@ -2559,7 +2564,7 @@
           <a:p>
             <a:fld id="{3FD5B866-13A1-FD42-B59E-EB112ACE594C}" type="datetimeFigureOut">
               <a:rPr lang="en-US" smtClean="0"/>
-              <a:t>4/10/18</a:t>
+              <a:t>4/11/2018</a:t>
             </a:fld>
             <a:endParaRPr lang="en-US"/>
           </a:p>
@@ -7302,6 +7307,420 @@
           </p:txBody>
         </p:sp>
       </p:grpSp>
+      <p:sp>
+        <p:nvSpPr>
+          <p:cNvPr id="96" name="Arc 95"/>
+          <p:cNvSpPr/>
+          <p:nvPr/>
+        </p:nvSpPr>
+        <p:spPr>
+          <a:xfrm rot="16200000" flipV="1">
+            <a:off x="2521914" y="3722928"/>
+            <a:ext cx="1346636" cy="1607621"/>
+          </a:xfrm>
+          <a:prstGeom prst="arc">
+            <a:avLst>
+              <a:gd name="adj1" fmla="val 19769342"/>
+              <a:gd name="adj2" fmla="val 2089572"/>
+            </a:avLst>
+          </a:prstGeom>
+          <a:ln>
+            <a:solidFill>
+              <a:schemeClr val="tx1"/>
+            </a:solidFill>
+          </a:ln>
+        </p:spPr>
+        <p:style>
+          <a:lnRef idx="1">
+            <a:schemeClr val="accent1"/>
+          </a:lnRef>
+          <a:fillRef idx="0">
+            <a:schemeClr val="accent1"/>
+          </a:fillRef>
+          <a:effectRef idx="0">
+            <a:schemeClr val="accent1"/>
+          </a:effectRef>
+          <a:fontRef idx="minor">
+            <a:schemeClr val="tx1"/>
+          </a:fontRef>
+        </p:style>
+        <p:txBody>
+          <a:bodyPr rtlCol="0" anchor="ctr"/>
+          <a:lstStyle/>
+          <a:p>
+            <a:pPr algn="ctr"/>
+            <a:endParaRPr lang="en-US"/>
+          </a:p>
+        </p:txBody>
+      </p:sp>
+      <p:sp>
+        <p:nvSpPr>
+          <p:cNvPr id="97" name="Arc 96"/>
+          <p:cNvSpPr/>
+          <p:nvPr/>
+        </p:nvSpPr>
+        <p:spPr>
+          <a:xfrm rot="16200000" flipV="1">
+            <a:off x="4614599" y="3724470"/>
+            <a:ext cx="1346636" cy="1607621"/>
+          </a:xfrm>
+          <a:prstGeom prst="arc">
+            <a:avLst>
+              <a:gd name="adj1" fmla="val 19769342"/>
+              <a:gd name="adj2" fmla="val 2089572"/>
+            </a:avLst>
+          </a:prstGeom>
+          <a:ln>
+            <a:solidFill>
+              <a:schemeClr val="tx1"/>
+            </a:solidFill>
+          </a:ln>
+        </p:spPr>
+        <p:style>
+          <a:lnRef idx="1">
+            <a:schemeClr val="accent1"/>
+          </a:lnRef>
+          <a:fillRef idx="0">
+            <a:schemeClr val="accent1"/>
+          </a:fillRef>
+          <a:effectRef idx="0">
+            <a:schemeClr val="accent1"/>
+          </a:effectRef>
+          <a:fontRef idx="minor">
+            <a:schemeClr val="tx1"/>
+          </a:fontRef>
+        </p:style>
+        <p:txBody>
+          <a:bodyPr rtlCol="0" anchor="ctr"/>
+          <a:lstStyle/>
+          <a:p>
+            <a:pPr algn="ctr"/>
+            <a:endParaRPr lang="en-US"/>
+          </a:p>
+        </p:txBody>
+      </p:sp>
+      <p:sp>
+        <p:nvSpPr>
+          <p:cNvPr id="98" name="Arc 97"/>
+          <p:cNvSpPr/>
+          <p:nvPr/>
+        </p:nvSpPr>
+        <p:spPr>
+          <a:xfrm rot="5400000" flipH="1" flipV="1">
+            <a:off x="3585252" y="3732872"/>
+            <a:ext cx="1346636" cy="1607621"/>
+          </a:xfrm>
+          <a:prstGeom prst="arc">
+            <a:avLst>
+              <a:gd name="adj1" fmla="val 19769342"/>
+              <a:gd name="adj2" fmla="val 2089572"/>
+            </a:avLst>
+          </a:prstGeom>
+          <a:ln>
+            <a:solidFill>
+              <a:schemeClr val="tx1"/>
+            </a:solidFill>
+          </a:ln>
+        </p:spPr>
+        <p:style>
+          <a:lnRef idx="1">
+            <a:schemeClr val="accent1"/>
+          </a:lnRef>
+          <a:fillRef idx="0">
+            <a:schemeClr val="accent1"/>
+          </a:fillRef>
+          <a:effectRef idx="0">
+            <a:schemeClr val="accent1"/>
+          </a:effectRef>
+          <a:fontRef idx="minor">
+            <a:schemeClr val="tx1"/>
+          </a:fontRef>
+        </p:style>
+        <p:txBody>
+          <a:bodyPr rtlCol="0" anchor="ctr"/>
+          <a:lstStyle/>
+          <a:p>
+            <a:pPr algn="ctr"/>
+            <a:endParaRPr lang="en-US"/>
+          </a:p>
+        </p:txBody>
+      </p:sp>
+      <p:sp>
+        <p:nvSpPr>
+          <p:cNvPr id="99" name="Arc 98"/>
+          <p:cNvSpPr/>
+          <p:nvPr/>
+        </p:nvSpPr>
+        <p:spPr>
+          <a:xfrm rot="16200000" flipV="1">
+            <a:off x="7369476" y="3691959"/>
+            <a:ext cx="1346636" cy="1607621"/>
+          </a:xfrm>
+          <a:prstGeom prst="arc">
+            <a:avLst>
+              <a:gd name="adj1" fmla="val 19769342"/>
+              <a:gd name="adj2" fmla="val 2089572"/>
+            </a:avLst>
+          </a:prstGeom>
+          <a:ln>
+            <a:solidFill>
+              <a:schemeClr val="tx1"/>
+            </a:solidFill>
+          </a:ln>
+        </p:spPr>
+        <p:style>
+          <a:lnRef idx="1">
+            <a:schemeClr val="accent1"/>
+          </a:lnRef>
+          <a:fillRef idx="0">
+            <a:schemeClr val="accent1"/>
+          </a:fillRef>
+          <a:effectRef idx="0">
+            <a:schemeClr val="accent1"/>
+          </a:effectRef>
+          <a:fontRef idx="minor">
+            <a:schemeClr val="tx1"/>
+          </a:fontRef>
+        </p:style>
+        <p:txBody>
+          <a:bodyPr rtlCol="0" anchor="ctr"/>
+          <a:lstStyle/>
+          <a:p>
+            <a:pPr algn="ctr"/>
+            <a:endParaRPr lang="en-US"/>
+          </a:p>
+        </p:txBody>
+      </p:sp>
+      <p:sp>
+        <p:nvSpPr>
+          <p:cNvPr id="100" name="Arc 99"/>
+          <p:cNvSpPr/>
+          <p:nvPr/>
+        </p:nvSpPr>
+        <p:spPr>
+          <a:xfrm rot="16200000" flipV="1">
+            <a:off x="9462161" y="3693501"/>
+            <a:ext cx="1346636" cy="1607621"/>
+          </a:xfrm>
+          <a:prstGeom prst="arc">
+            <a:avLst>
+              <a:gd name="adj1" fmla="val 19769342"/>
+              <a:gd name="adj2" fmla="val 2089572"/>
+            </a:avLst>
+          </a:prstGeom>
+          <a:ln>
+            <a:solidFill>
+              <a:schemeClr val="tx1"/>
+            </a:solidFill>
+          </a:ln>
+        </p:spPr>
+        <p:style>
+          <a:lnRef idx="1">
+            <a:schemeClr val="accent1"/>
+          </a:lnRef>
+          <a:fillRef idx="0">
+            <a:schemeClr val="accent1"/>
+          </a:fillRef>
+          <a:effectRef idx="0">
+            <a:schemeClr val="accent1"/>
+          </a:effectRef>
+          <a:fontRef idx="minor">
+            <a:schemeClr val="tx1"/>
+          </a:fontRef>
+        </p:style>
+        <p:txBody>
+          <a:bodyPr rtlCol="0" anchor="ctr"/>
+          <a:lstStyle/>
+          <a:p>
+            <a:pPr algn="ctr"/>
+            <a:endParaRPr lang="en-US"/>
+          </a:p>
+        </p:txBody>
+      </p:sp>
+      <p:sp>
+        <p:nvSpPr>
+          <p:cNvPr id="101" name="Arc 100"/>
+          <p:cNvSpPr/>
+          <p:nvPr/>
+        </p:nvSpPr>
+        <p:spPr>
+          <a:xfrm rot="5400000" flipH="1" flipV="1">
+            <a:off x="8432814" y="3701903"/>
+            <a:ext cx="1346636" cy="1607621"/>
+          </a:xfrm>
+          <a:prstGeom prst="arc">
+            <a:avLst>
+              <a:gd name="adj1" fmla="val 19769342"/>
+              <a:gd name="adj2" fmla="val 2089572"/>
+            </a:avLst>
+          </a:prstGeom>
+          <a:ln>
+            <a:solidFill>
+              <a:schemeClr val="tx1"/>
+            </a:solidFill>
+          </a:ln>
+        </p:spPr>
+        <p:style>
+          <a:lnRef idx="1">
+            <a:schemeClr val="accent1"/>
+          </a:lnRef>
+          <a:fillRef idx="0">
+            <a:schemeClr val="accent1"/>
+          </a:fillRef>
+          <a:effectRef idx="0">
+            <a:schemeClr val="accent1"/>
+          </a:effectRef>
+          <a:fontRef idx="minor">
+            <a:schemeClr val="tx1"/>
+          </a:fontRef>
+        </p:style>
+        <p:txBody>
+          <a:bodyPr rtlCol="0" anchor="ctr"/>
+          <a:lstStyle/>
+          <a:p>
+            <a:pPr algn="ctr"/>
+            <a:endParaRPr lang="en-US"/>
+          </a:p>
+        </p:txBody>
+      </p:sp>
+      <p:sp>
+        <p:nvSpPr>
+          <p:cNvPr id="102" name="Arc 101"/>
+          <p:cNvSpPr/>
+          <p:nvPr/>
+        </p:nvSpPr>
+        <p:spPr>
+          <a:xfrm rot="5400000">
+            <a:off x="7380254" y="4049755"/>
+            <a:ext cx="1346636" cy="1607621"/>
+          </a:xfrm>
+          <a:prstGeom prst="arc">
+            <a:avLst>
+              <a:gd name="adj1" fmla="val 19769342"/>
+              <a:gd name="adj2" fmla="val 2089572"/>
+            </a:avLst>
+          </a:prstGeom>
+          <a:ln>
+            <a:solidFill>
+              <a:schemeClr val="tx1"/>
+            </a:solidFill>
+          </a:ln>
+        </p:spPr>
+        <p:style>
+          <a:lnRef idx="1">
+            <a:schemeClr val="accent1"/>
+          </a:lnRef>
+          <a:fillRef idx="0">
+            <a:schemeClr val="accent1"/>
+          </a:fillRef>
+          <a:effectRef idx="0">
+            <a:schemeClr val="accent1"/>
+          </a:effectRef>
+          <a:fontRef idx="minor">
+            <a:schemeClr val="tx1"/>
+          </a:fontRef>
+        </p:style>
+        <p:txBody>
+          <a:bodyPr rtlCol="0" anchor="ctr"/>
+          <a:lstStyle/>
+          <a:p>
+            <a:pPr algn="ctr"/>
+            <a:endParaRPr lang="en-US"/>
+          </a:p>
+        </p:txBody>
+      </p:sp>
+      <p:sp>
+        <p:nvSpPr>
+          <p:cNvPr id="103" name="Arc 102"/>
+          <p:cNvSpPr/>
+          <p:nvPr/>
+        </p:nvSpPr>
+        <p:spPr>
+          <a:xfrm rot="5400000">
+            <a:off x="9472939" y="4051297"/>
+            <a:ext cx="1346636" cy="1607621"/>
+          </a:xfrm>
+          <a:prstGeom prst="arc">
+            <a:avLst>
+              <a:gd name="adj1" fmla="val 19769342"/>
+              <a:gd name="adj2" fmla="val 2089572"/>
+            </a:avLst>
+          </a:prstGeom>
+          <a:ln>
+            <a:solidFill>
+              <a:schemeClr val="tx1"/>
+            </a:solidFill>
+          </a:ln>
+        </p:spPr>
+        <p:style>
+          <a:lnRef idx="1">
+            <a:schemeClr val="accent1"/>
+          </a:lnRef>
+          <a:fillRef idx="0">
+            <a:schemeClr val="accent1"/>
+          </a:fillRef>
+          <a:effectRef idx="0">
+            <a:schemeClr val="accent1"/>
+          </a:effectRef>
+          <a:fontRef idx="minor">
+            <a:schemeClr val="tx1"/>
+          </a:fontRef>
+        </p:style>
+        <p:txBody>
+          <a:bodyPr rtlCol="0" anchor="ctr"/>
+          <a:lstStyle/>
+          <a:p>
+            <a:pPr algn="ctr"/>
+            <a:endParaRPr lang="en-US"/>
+          </a:p>
+        </p:txBody>
+      </p:sp>
+      <p:sp>
+        <p:nvSpPr>
+          <p:cNvPr id="104" name="Arc 103"/>
+          <p:cNvSpPr/>
+          <p:nvPr/>
+        </p:nvSpPr>
+        <p:spPr>
+          <a:xfrm rot="16200000" flipH="1">
+            <a:off x="8443592" y="4059699"/>
+            <a:ext cx="1346636" cy="1607621"/>
+          </a:xfrm>
+          <a:prstGeom prst="arc">
+            <a:avLst>
+              <a:gd name="adj1" fmla="val 19769342"/>
+              <a:gd name="adj2" fmla="val 2089572"/>
+            </a:avLst>
+          </a:prstGeom>
+          <a:ln>
+            <a:solidFill>
+              <a:schemeClr val="tx1"/>
+            </a:solidFill>
+          </a:ln>
+        </p:spPr>
+        <p:style>
+          <a:lnRef idx="1">
+            <a:schemeClr val="accent1"/>
+          </a:lnRef>
+          <a:fillRef idx="0">
+            <a:schemeClr val="accent1"/>
+          </a:fillRef>
+          <a:effectRef idx="0">
+            <a:schemeClr val="accent1"/>
+          </a:effectRef>
+          <a:fontRef idx="minor">
+            <a:schemeClr val="tx1"/>
+          </a:fontRef>
+        </p:style>
+        <p:txBody>
+          <a:bodyPr rtlCol="0" anchor="ctr"/>
+          <a:lstStyle/>
+          <a:p>
+            <a:pPr algn="ctr"/>
+            <a:endParaRPr lang="en-US"/>
+          </a:p>
+        </p:txBody>
+      </p:sp>
     </p:spTree>
     <p:extLst>
       <p:ext uri="{BB962C8B-B14F-4D97-AF65-F5344CB8AC3E}">

</xml_diff>